<commit_message>
updating data collection tool
</commit_message>
<xml_diff>
--- a/user-study/instructions/Instructions-V2.pptx
+++ b/user-study/instructions/Instructions-V2.pptx
@@ -261,7 +261,7 @@
           <a:p>
             <a:fld id="{D98ADB59-0FC3-4F23-98C1-896570F2CCB9}" type="datetimeFigureOut">
               <a:rPr lang="en-US" smtClean="0"/>
-              <a:t>5/3/20</a:t>
+              <a:t>6/8/2020</a:t>
             </a:fld>
             <a:endParaRPr lang="en-US"/>
           </a:p>
@@ -431,7 +431,7 @@
           <a:p>
             <a:fld id="{D98ADB59-0FC3-4F23-98C1-896570F2CCB9}" type="datetimeFigureOut">
               <a:rPr lang="en-US" smtClean="0"/>
-              <a:t>5/3/20</a:t>
+              <a:t>6/8/2020</a:t>
             </a:fld>
             <a:endParaRPr lang="en-US"/>
           </a:p>
@@ -611,7 +611,7 @@
           <a:p>
             <a:fld id="{D98ADB59-0FC3-4F23-98C1-896570F2CCB9}" type="datetimeFigureOut">
               <a:rPr lang="en-US" smtClean="0"/>
-              <a:t>5/3/20</a:t>
+              <a:t>6/8/2020</a:t>
             </a:fld>
             <a:endParaRPr lang="en-US"/>
           </a:p>
@@ -781,7 +781,7 @@
           <a:p>
             <a:fld id="{D98ADB59-0FC3-4F23-98C1-896570F2CCB9}" type="datetimeFigureOut">
               <a:rPr lang="en-US" smtClean="0"/>
-              <a:t>5/3/20</a:t>
+              <a:t>6/8/2020</a:t>
             </a:fld>
             <a:endParaRPr lang="en-US"/>
           </a:p>
@@ -1025,7 +1025,7 @@
           <a:p>
             <a:fld id="{D98ADB59-0FC3-4F23-98C1-896570F2CCB9}" type="datetimeFigureOut">
               <a:rPr lang="en-US" smtClean="0"/>
-              <a:t>5/3/20</a:t>
+              <a:t>6/8/2020</a:t>
             </a:fld>
             <a:endParaRPr lang="en-US"/>
           </a:p>
@@ -1257,7 +1257,7 @@
           <a:p>
             <a:fld id="{D98ADB59-0FC3-4F23-98C1-896570F2CCB9}" type="datetimeFigureOut">
               <a:rPr lang="en-US" smtClean="0"/>
-              <a:t>5/3/20</a:t>
+              <a:t>6/8/2020</a:t>
             </a:fld>
             <a:endParaRPr lang="en-US"/>
           </a:p>
@@ -1624,7 +1624,7 @@
           <a:p>
             <a:fld id="{D98ADB59-0FC3-4F23-98C1-896570F2CCB9}" type="datetimeFigureOut">
               <a:rPr lang="en-US" smtClean="0"/>
-              <a:t>5/3/20</a:t>
+              <a:t>6/8/2020</a:t>
             </a:fld>
             <a:endParaRPr lang="en-US"/>
           </a:p>
@@ -1742,7 +1742,7 @@
           <a:p>
             <a:fld id="{D98ADB59-0FC3-4F23-98C1-896570F2CCB9}" type="datetimeFigureOut">
               <a:rPr lang="en-US" smtClean="0"/>
-              <a:t>5/3/20</a:t>
+              <a:t>6/8/2020</a:t>
             </a:fld>
             <a:endParaRPr lang="en-US"/>
           </a:p>
@@ -1837,7 +1837,7 @@
           <a:p>
             <a:fld id="{D98ADB59-0FC3-4F23-98C1-896570F2CCB9}" type="datetimeFigureOut">
               <a:rPr lang="en-US" smtClean="0"/>
-              <a:t>5/3/20</a:t>
+              <a:t>6/8/2020</a:t>
             </a:fld>
             <a:endParaRPr lang="en-US"/>
           </a:p>
@@ -2114,7 +2114,7 @@
           <a:p>
             <a:fld id="{D98ADB59-0FC3-4F23-98C1-896570F2CCB9}" type="datetimeFigureOut">
               <a:rPr lang="en-US" smtClean="0"/>
-              <a:t>5/3/20</a:t>
+              <a:t>6/8/2020</a:t>
             </a:fld>
             <a:endParaRPr lang="en-US"/>
           </a:p>
@@ -2371,7 +2371,7 @@
           <a:p>
             <a:fld id="{D98ADB59-0FC3-4F23-98C1-896570F2CCB9}" type="datetimeFigureOut">
               <a:rPr lang="en-US" smtClean="0"/>
-              <a:t>5/3/20</a:t>
+              <a:t>6/8/2020</a:t>
             </a:fld>
             <a:endParaRPr lang="en-US"/>
           </a:p>
@@ -2584,7 +2584,7 @@
           <a:p>
             <a:fld id="{D98ADB59-0FC3-4F23-98C1-896570F2CCB9}" type="datetimeFigureOut">
               <a:rPr lang="en-US" smtClean="0"/>
-              <a:t>5/3/20</a:t>
+              <a:t>6/8/2020</a:t>
             </a:fld>
             <a:endParaRPr lang="en-US"/>
           </a:p>
@@ -3474,7 +3474,7 @@
         <p:spPr>
           <a:xfrm>
             <a:off x="2242292" y="5571810"/>
-            <a:ext cx="3015570" cy="369332"/>
+            <a:ext cx="3015570" cy="923330"/>
           </a:xfrm>
           <a:prstGeom prst="rect">
             <a:avLst/>
@@ -3497,6 +3497,26 @@
             <a:r>
               <a:rPr lang="en-US" dirty="0"/>
               <a:t>Your Rating on scale of 1 to 10</a:t>
+            </a:r>
+          </a:p>
+          <a:p>
+            <a:r>
+              <a:rPr lang="en-US" b="1" dirty="0"/>
+              <a:t>1:</a:t>
+            </a:r>
+            <a:r>
+              <a:rPr lang="en-US" dirty="0"/>
+              <a:t> worst explanation</a:t>
+            </a:r>
+          </a:p>
+          <a:p>
+            <a:r>
+              <a:rPr lang="en-US" b="1" dirty="0"/>
+              <a:t>10:</a:t>
+            </a:r>
+            <a:r>
+              <a:rPr lang="en-US" dirty="0"/>
+              <a:t> best explanation</a:t>
             </a:r>
           </a:p>
         </p:txBody>
@@ -3555,25 +3575,110 @@
           </a:p>
         </p:txBody>
       </p:sp>
+      <p:sp>
+        <p:nvSpPr>
+          <p:cNvPr id="22" name="TextBox 21">
+            <a:extLst>
+              <a:ext uri="{FF2B5EF4-FFF2-40B4-BE49-F238E27FC236}">
+                <a16:creationId xmlns:a16="http://schemas.microsoft.com/office/drawing/2014/main" id="{13617C29-7C4C-4D91-8858-747749E47ED2}"/>
+              </a:ext>
+            </a:extLst>
+          </p:cNvPr>
+          <p:cNvSpPr txBox="1"/>
+          <p:nvPr/>
+        </p:nvSpPr>
+        <p:spPr>
+          <a:xfrm>
+            <a:off x="5518892" y="1600200"/>
+            <a:ext cx="2231986" cy="923330"/>
+          </a:xfrm>
+          <a:prstGeom prst="rect">
+            <a:avLst/>
+          </a:prstGeom>
+          <a:solidFill>
+            <a:schemeClr val="bg1"/>
+          </a:solidFill>
+          <a:ln>
+            <a:solidFill>
+              <a:srgbClr val="FF0000"/>
+            </a:solidFill>
+          </a:ln>
+        </p:spPr>
+        <p:style>
+          <a:lnRef idx="2">
+            <a:schemeClr val="accent2"/>
+          </a:lnRef>
+          <a:fillRef idx="1">
+            <a:schemeClr val="lt1"/>
+          </a:fillRef>
+          <a:effectRef idx="0">
+            <a:schemeClr val="accent2"/>
+          </a:effectRef>
+          <a:fontRef idx="minor">
+            <a:schemeClr val="dk1"/>
+          </a:fontRef>
+        </p:style>
+        <p:txBody>
+          <a:bodyPr wrap="square" rtlCol="0">
+            <a:spAutoFit/>
+          </a:bodyPr>
+          <a:lstStyle/>
+          <a:p>
+            <a:r>
+              <a:rPr lang="en-US" dirty="0"/>
+              <a:t>Heatmap shows the important regions the AI uses to detect ‘cat’</a:t>
+            </a:r>
+          </a:p>
+        </p:txBody>
+      </p:sp>
+      <p:pic>
+        <p:nvPicPr>
+          <p:cNvPr id="2" name="Picture 1">
+            <a:extLst>
+              <a:ext uri="{FF2B5EF4-FFF2-40B4-BE49-F238E27FC236}">
+                <a16:creationId xmlns:a16="http://schemas.microsoft.com/office/drawing/2014/main" id="{1357FCBF-544B-43EC-94AF-6626F2896B25}"/>
+              </a:ext>
+            </a:extLst>
+          </p:cNvPr>
+          <p:cNvPicPr>
+            <a:picLocks noChangeAspect="1"/>
+          </p:cNvPicPr>
+          <p:nvPr/>
+        </p:nvPicPr>
+        <p:blipFill>
+          <a:blip r:embed="rId3"/>
+          <a:stretch>
+            <a:fillRect/>
+          </a:stretch>
+        </p:blipFill>
+        <p:spPr>
+          <a:xfrm>
+            <a:off x="2057399" y="1600199"/>
+            <a:ext cx="3352801" cy="3274144"/>
+          </a:xfrm>
+          <a:prstGeom prst="rect">
+            <a:avLst/>
+          </a:prstGeom>
+        </p:spPr>
+      </p:pic>
       <p:cxnSp>
         <p:nvCxnSpPr>
-          <p:cNvPr id="18" name="Straight Arrow Connector 17">
+          <p:cNvPr id="10" name="Straight Arrow Connector 9">
             <a:extLst>
               <a:ext uri="{FF2B5EF4-FFF2-40B4-BE49-F238E27FC236}">
-                <a16:creationId xmlns:a16="http://schemas.microsoft.com/office/drawing/2014/main" id="{6E020DE6-56F8-46C9-B444-D83EE302A217}"/>
+                <a16:creationId xmlns:a16="http://schemas.microsoft.com/office/drawing/2014/main" id="{11D53C53-E645-429F-91F2-BCD5B406C6DF}"/>
               </a:ext>
             </a:extLst>
           </p:cNvPr>
           <p:cNvCxnSpPr>
             <a:cxnSpLocks/>
-            <a:stCxn id="22" idx="1"/>
           </p:cNvCxnSpPr>
           <p:nvPr/>
         </p:nvCxnSpPr>
         <p:spPr>
           <a:xfrm flipH="1">
-            <a:off x="4147293" y="2061865"/>
-            <a:ext cx="1371599" cy="377232"/>
+            <a:off x="4572000" y="2061865"/>
+            <a:ext cx="946894" cy="923330"/>
           </a:xfrm>
           <a:prstGeom prst="straightConnector1">
             <a:avLst/>
@@ -3603,16 +3708,15 @@
       </p:cxnSp>
       <p:cxnSp>
         <p:nvCxnSpPr>
-          <p:cNvPr id="31" name="Straight Arrow Connector 30">
+          <p:cNvPr id="11" name="Straight Arrow Connector 10">
             <a:extLst>
               <a:ext uri="{FF2B5EF4-FFF2-40B4-BE49-F238E27FC236}">
-                <a16:creationId xmlns:a16="http://schemas.microsoft.com/office/drawing/2014/main" id="{39565834-1954-214E-A955-095122108C7D}"/>
+                <a16:creationId xmlns:a16="http://schemas.microsoft.com/office/drawing/2014/main" id="{FE9B03B6-F1FC-4A96-94A2-BB48A413D8E4}"/>
               </a:ext>
             </a:extLst>
           </p:cNvPr>
           <p:cNvCxnSpPr>
             <a:cxnSpLocks/>
-            <a:stCxn id="22" idx="1"/>
           </p:cNvCxnSpPr>
           <p:nvPr/>
         </p:nvCxnSpPr>
@@ -3647,62 +3751,6 @@
           </a:fontRef>
         </p:style>
       </p:cxnSp>
-      <p:sp>
-        <p:nvSpPr>
-          <p:cNvPr id="22" name="TextBox 21">
-            <a:extLst>
-              <a:ext uri="{FF2B5EF4-FFF2-40B4-BE49-F238E27FC236}">
-                <a16:creationId xmlns:a16="http://schemas.microsoft.com/office/drawing/2014/main" id="{13617C29-7C4C-4D91-8858-747749E47ED2}"/>
-              </a:ext>
-            </a:extLst>
-          </p:cNvPr>
-          <p:cNvSpPr txBox="1"/>
-          <p:nvPr/>
-        </p:nvSpPr>
-        <p:spPr>
-          <a:xfrm>
-            <a:off x="5518892" y="1600200"/>
-            <a:ext cx="2231986" cy="923330"/>
-          </a:xfrm>
-          <a:prstGeom prst="rect">
-            <a:avLst/>
-          </a:prstGeom>
-          <a:solidFill>
-            <a:schemeClr val="bg1"/>
-          </a:solidFill>
-          <a:ln>
-            <a:solidFill>
-              <a:srgbClr val="FF0000"/>
-            </a:solidFill>
-          </a:ln>
-        </p:spPr>
-        <p:style>
-          <a:lnRef idx="2">
-            <a:schemeClr val="accent2"/>
-          </a:lnRef>
-          <a:fillRef idx="1">
-            <a:schemeClr val="lt1"/>
-          </a:fillRef>
-          <a:effectRef idx="0">
-            <a:schemeClr val="accent2"/>
-          </a:effectRef>
-          <a:fontRef idx="minor">
-            <a:schemeClr val="dk1"/>
-          </a:fontRef>
-        </p:style>
-        <p:txBody>
-          <a:bodyPr wrap="square" rtlCol="0">
-            <a:spAutoFit/>
-          </a:bodyPr>
-          <a:lstStyle/>
-          <a:p>
-            <a:r>
-              <a:rPr lang="en-US" dirty="0"/>
-              <a:t>Heatmap shows the important regions the AI uses to detect ‘cat’</a:t>
-            </a:r>
-          </a:p>
-        </p:txBody>
-      </p:sp>
     </p:spTree>
     <p:extLst>
       <p:ext uri="{BB962C8B-B14F-4D97-AF65-F5344CB8AC3E}">
@@ -3771,60 +3819,6 @@
       </p:pic>
       <p:sp>
         <p:nvSpPr>
-          <p:cNvPr id="13" name="Rectangle: Rounded Corners 12">
-            <a:extLst>
-              <a:ext uri="{FF2B5EF4-FFF2-40B4-BE49-F238E27FC236}">
-                <a16:creationId xmlns:a16="http://schemas.microsoft.com/office/drawing/2014/main" id="{BF683DC5-3B78-284D-B497-6FBC7A95584C}"/>
-              </a:ext>
-            </a:extLst>
-          </p:cNvPr>
-          <p:cNvSpPr/>
-          <p:nvPr/>
-        </p:nvSpPr>
-        <p:spPr>
-          <a:xfrm>
-            <a:off x="2321815" y="4903842"/>
-            <a:ext cx="2731008" cy="150642"/>
-          </a:xfrm>
-          <a:prstGeom prst="roundRect">
-            <a:avLst/>
-          </a:prstGeom>
-          <a:noFill/>
-          <a:ln w="28575" cap="flat" cmpd="sng" algn="ctr">
-            <a:solidFill>
-              <a:srgbClr val="FF0000"/>
-            </a:solidFill>
-            <a:prstDash val="solid"/>
-            <a:round/>
-            <a:headEnd type="none" w="med" len="med"/>
-            <a:tailEnd type="none" w="med" len="med"/>
-          </a:ln>
-        </p:spPr>
-        <p:style>
-          <a:lnRef idx="0">
-            <a:scrgbClr r="0" g="0" b="0"/>
-          </a:lnRef>
-          <a:fillRef idx="0">
-            <a:scrgbClr r="0" g="0" b="0"/>
-          </a:fillRef>
-          <a:effectRef idx="0">
-            <a:scrgbClr r="0" g="0" b="0"/>
-          </a:effectRef>
-          <a:fontRef idx="minor">
-            <a:schemeClr val="accent2"/>
-          </a:fontRef>
-        </p:style>
-        <p:txBody>
-          <a:bodyPr rtlCol="0" anchor="ctr"/>
-          <a:lstStyle/>
-          <a:p>
-            <a:pPr algn="ctr"/>
-            <a:endParaRPr lang="en-US"/>
-          </a:p>
-        </p:txBody>
-      </p:sp>
-      <p:sp>
-        <p:nvSpPr>
           <p:cNvPr id="14" name="TextBox 13">
             <a:extLst>
               <a:ext uri="{FF2B5EF4-FFF2-40B4-BE49-F238E27FC236}">
@@ -3874,7 +3868,6 @@
           </p:cNvPr>
           <p:cNvCxnSpPr>
             <a:cxnSpLocks/>
-            <a:stCxn id="13" idx="3"/>
             <a:endCxn id="14" idx="1"/>
           </p:cNvCxnSpPr>
           <p:nvPr/>
@@ -4233,6 +4226,90 @@
               <a:rPr lang="en-US" dirty="0"/>
               <a:t>Click to select a rating</a:t>
             </a:r>
+          </a:p>
+        </p:txBody>
+      </p:sp>
+      <p:pic>
+        <p:nvPicPr>
+          <p:cNvPr id="2" name="Picture 1">
+            <a:extLst>
+              <a:ext uri="{FF2B5EF4-FFF2-40B4-BE49-F238E27FC236}">
+                <a16:creationId xmlns:a16="http://schemas.microsoft.com/office/drawing/2014/main" id="{A477F5FD-B8B4-4CEC-9333-8B5ABA1ABA6E}"/>
+              </a:ext>
+            </a:extLst>
+          </p:cNvPr>
+          <p:cNvPicPr>
+            <a:picLocks noChangeAspect="1"/>
+          </p:cNvPicPr>
+          <p:nvPr/>
+        </p:nvPicPr>
+        <p:blipFill>
+          <a:blip r:embed="rId5"/>
+          <a:stretch>
+            <a:fillRect/>
+          </a:stretch>
+        </p:blipFill>
+        <p:spPr>
+          <a:xfrm>
+            <a:off x="2014788" y="1595135"/>
+            <a:ext cx="3319211" cy="3330981"/>
+          </a:xfrm>
+          <a:prstGeom prst="rect">
+            <a:avLst/>
+          </a:prstGeom>
+        </p:spPr>
+      </p:pic>
+      <p:sp>
+        <p:nvSpPr>
+          <p:cNvPr id="23" name="Rectangle: Rounded Corners 22">
+            <a:extLst>
+              <a:ext uri="{FF2B5EF4-FFF2-40B4-BE49-F238E27FC236}">
+                <a16:creationId xmlns:a16="http://schemas.microsoft.com/office/drawing/2014/main" id="{4191B79B-C8CB-4F77-BDDA-75059383A77A}"/>
+              </a:ext>
+            </a:extLst>
+          </p:cNvPr>
+          <p:cNvSpPr/>
+          <p:nvPr/>
+        </p:nvSpPr>
+        <p:spPr>
+          <a:xfrm>
+            <a:off x="2321815" y="4903842"/>
+            <a:ext cx="2731008" cy="150642"/>
+          </a:xfrm>
+          <a:prstGeom prst="roundRect">
+            <a:avLst/>
+          </a:prstGeom>
+          <a:noFill/>
+          <a:ln w="28575" cap="flat" cmpd="sng" algn="ctr">
+            <a:solidFill>
+              <a:srgbClr val="FF0000"/>
+            </a:solidFill>
+            <a:prstDash val="solid"/>
+            <a:round/>
+            <a:headEnd type="none" w="med" len="med"/>
+            <a:tailEnd type="none" w="med" len="med"/>
+          </a:ln>
+        </p:spPr>
+        <p:style>
+          <a:lnRef idx="0">
+            <a:scrgbClr r="0" g="0" b="0"/>
+          </a:lnRef>
+          <a:fillRef idx="0">
+            <a:scrgbClr r="0" g="0" b="0"/>
+          </a:fillRef>
+          <a:effectRef idx="0">
+            <a:scrgbClr r="0" g="0" b="0"/>
+          </a:effectRef>
+          <a:fontRef idx="minor">
+            <a:schemeClr val="accent2"/>
+          </a:fontRef>
+        </p:style>
+        <p:txBody>
+          <a:bodyPr rtlCol="0" anchor="ctr"/>
+          <a:lstStyle/>
+          <a:p>
+            <a:pPr algn="ctr"/>
+            <a:endParaRPr lang="en-US"/>
           </a:p>
         </p:txBody>
       </p:sp>

</xml_diff>